<commit_message>
Added Category and Products pages
</commit_message>
<xml_diff>
--- a/Inception/Project Slides.pptx
+++ b/Inception/Project Slides.pptx
@@ -6,14 +6,11 @@
   </p:sldMasterIdLst>
   <p:sldIdLst>
     <p:sldId id="257" r:id="rId2"/>
-    <p:sldId id="259" r:id="rId3"/>
-    <p:sldId id="260" r:id="rId4"/>
-    <p:sldId id="261" r:id="rId5"/>
-    <p:sldId id="262" r:id="rId6"/>
-    <p:sldId id="263" r:id="rId7"/>
-    <p:sldId id="264" r:id="rId8"/>
-    <p:sldId id="265" r:id="rId9"/>
-    <p:sldId id="258" r:id="rId10"/>
+    <p:sldId id="260" r:id="rId3"/>
+    <p:sldId id="263" r:id="rId4"/>
+    <p:sldId id="264" r:id="rId5"/>
+    <p:sldId id="265" r:id="rId6"/>
+    <p:sldId id="258" r:id="rId7"/>
   </p:sldIdLst>
   <p:sldSz cx="12192000" cy="6858000"/>
   <p:notesSz cx="6858000" cy="9144000"/>
@@ -364,7 +361,7 @@
           <a:p>
             <a:fld id="{9184DA70-C731-4C70-880D-CCD4705E623C}" type="datetime1">
               <a:rPr lang="en-US" smtClean="0"/>
-              <a:t>2/10/2020</a:t>
+              <a:t>3/4/2020</a:t>
             </a:fld>
             <a:endParaRPr lang="en-US" dirty="0"/>
           </a:p>
@@ -552,7 +549,7 @@
           <a:p>
             <a:fld id="{B612A279-0833-481D-8C56-F67FD0AC6C50}" type="datetime1">
               <a:rPr lang="en-US" smtClean="0"/>
-              <a:t>2/10/2020</a:t>
+              <a:t>3/4/2020</a:t>
             </a:fld>
             <a:endParaRPr lang="en-US" dirty="0"/>
           </a:p>
@@ -794,7 +791,7 @@
           <a:p>
             <a:fld id="{6587DA83-5663-4C9C-B9AA-0B40A3DAFF81}" type="datetime1">
               <a:rPr lang="en-US" smtClean="0"/>
-              <a:t>2/10/2020</a:t>
+              <a:t>3/4/2020</a:t>
             </a:fld>
             <a:endParaRPr lang="en-US" dirty="0"/>
           </a:p>
@@ -982,7 +979,7 @@
           <a:p>
             <a:fld id="{4BE1D723-8F53-4F53-90B0-1982A396982E}" type="datetime1">
               <a:rPr lang="en-US" smtClean="0"/>
-              <a:t>2/10/2020</a:t>
+              <a:t>3/4/2020</a:t>
             </a:fld>
             <a:endParaRPr lang="en-US" dirty="0"/>
           </a:p>
@@ -1355,7 +1352,7 @@
           <a:p>
             <a:fld id="{97669AF7-7BEB-44E4-9852-375E34362B5B}" type="datetime1">
               <a:rPr lang="en-US" smtClean="0"/>
-              <a:t>2/10/2020</a:t>
+              <a:t>3/4/2020</a:t>
             </a:fld>
             <a:endParaRPr lang="en-US" dirty="0"/>
           </a:p>
@@ -1610,7 +1607,7 @@
           <a:p>
             <a:fld id="{BAAAC38D-0552-4C82-B593-E6124DFADBE2}" type="datetime1">
               <a:rPr lang="en-US" smtClean="0"/>
-              <a:t>2/10/2020</a:t>
+              <a:t>3/4/2020</a:t>
             </a:fld>
             <a:endParaRPr lang="en-US" dirty="0"/>
           </a:p>
@@ -2007,7 +2004,7 @@
           <a:p>
             <a:fld id="{D9DF0F1C-5577-4ACB-BB62-DF8F3C494C7E}" type="datetime1">
               <a:rPr lang="en-US" smtClean="0"/>
-              <a:t>2/10/2020</a:t>
+              <a:t>3/4/2020</a:t>
             </a:fld>
             <a:endParaRPr lang="en-US" dirty="0"/>
           </a:p>
@@ -2143,7 +2140,7 @@
           <a:p>
             <a:fld id="{1775B394-D9F9-4F0C-B15D-605F45CB9E9F}" type="datetime1">
               <a:rPr lang="en-US" smtClean="0"/>
-              <a:t>2/10/2020</a:t>
+              <a:t>3/4/2020</a:t>
             </a:fld>
             <a:endParaRPr lang="en-US" dirty="0"/>
           </a:p>
@@ -2300,7 +2297,7 @@
           <a:p>
             <a:fld id="{39667345-2558-425A-8533-9BFDBCE15005}" type="datetime1">
               <a:rPr lang="en-US" smtClean="0"/>
-              <a:t>2/10/2020</a:t>
+              <a:t>3/4/2020</a:t>
             </a:fld>
             <a:endParaRPr lang="en-US" dirty="0"/>
           </a:p>
@@ -2629,7 +2626,7 @@
           <a:p>
             <a:fld id="{92BEA474-078D-4E9B-9B14-09A87B19DC46}" type="datetime1">
               <a:rPr lang="en-US" smtClean="0"/>
-              <a:t>2/10/2020</a:t>
+              <a:t>3/4/2020</a:t>
             </a:fld>
             <a:endParaRPr lang="en-US" dirty="0"/>
           </a:p>
@@ -2979,7 +2976,7 @@
           <a:p>
             <a:fld id="{4907D986-8816-4272-A432-0437A28A9828}" type="datetime1">
               <a:rPr lang="en-US" smtClean="0"/>
-              <a:t>2/10/2020</a:t>
+              <a:t>3/4/2020</a:t>
             </a:fld>
             <a:endParaRPr lang="en-US" dirty="0"/>
           </a:p>
@@ -3240,7 +3237,7 @@
           <a:p>
             <a:fld id="{62D6E202-B606-4609-B914-27C9371A1F6D}" type="datetime1">
               <a:rPr lang="en-US" smtClean="0"/>
-              <a:t>2/10/2020</a:t>
+              <a:t>3/4/2020</a:t>
             </a:fld>
             <a:endParaRPr lang="en-US" dirty="0"/>
           </a:p>
@@ -3849,20 +3846,34 @@
         </p:nvSpPr>
         <p:spPr>
           <a:xfrm>
-            <a:off x="5289754" y="639097"/>
+            <a:off x="5060425" y="1830334"/>
             <a:ext cx="6253317" cy="3686015"/>
           </a:xfrm>
         </p:spPr>
         <p:txBody>
           <a:bodyPr>
-            <a:normAutofit/>
+            <a:normAutofit fontScale="90000"/>
           </a:bodyPr>
           <a:lstStyle/>
           <a:p>
             <a:pPr algn="ctr"/>
             <a:r>
               <a:rPr lang="en-US" sz="8000" dirty="0"/>
-              <a:t>Computer Programmer</a:t>
+              <a:t>Computer Programmer:</a:t>
+            </a:r>
+            <a:br>
+              <a:rPr lang="en-US" sz="8000" dirty="0"/>
+            </a:br>
+            <a:r>
+              <a:rPr lang="en-US" sz="8000" dirty="0"/>
+              <a:t>FPS </a:t>
+            </a:r>
+            <a:br>
+              <a:rPr lang="en-US" sz="8000" dirty="0"/>
+            </a:br>
+            <a:r>
+              <a:rPr lang="en-US" sz="8000" dirty="0"/>
+              <a:t>Inventory</a:t>
             </a:r>
           </a:p>
         </p:txBody>
@@ -4073,245 +4084,26 @@
         </p:nvSpPr>
         <p:spPr>
           <a:xfrm>
-            <a:off x="5289754" y="639097"/>
-            <a:ext cx="6253317" cy="3686015"/>
-          </a:xfrm>
-        </p:spPr>
-        <p:txBody>
-          <a:bodyPr>
-            <a:normAutofit/>
-          </a:bodyPr>
-          <a:lstStyle/>
-          <a:p>
-            <a:pPr algn="ctr"/>
-            <a:r>
-              <a:rPr lang="en-US" sz="8000" dirty="0"/>
-              <a:t>FPS Inventory</a:t>
-            </a:r>
-          </a:p>
-        </p:txBody>
-      </p:sp>
-      <p:pic>
-        <p:nvPicPr>
-          <p:cNvPr id="5" name="Picture 4" descr="A picture containing building, sitting, bench, side&#10;&#10;Description automatically generated">
-            <a:extLst>
-              <a:ext uri="{FF2B5EF4-FFF2-40B4-BE49-F238E27FC236}">
-                <a16:creationId xmlns:a16="http://schemas.microsoft.com/office/drawing/2014/main" id="{282CF6DD-7FE8-4063-9551-1B7BBCE92ABE}"/>
-              </a:ext>
-            </a:extLst>
-          </p:cNvPr>
-          <p:cNvPicPr>
-            <a:picLocks noChangeAspect="1"/>
-          </p:cNvPicPr>
-          <p:nvPr/>
-        </p:nvPicPr>
-        <p:blipFill rotWithShape="1">
-          <a:blip r:embed="rId2">
-            <a:extLst>
-              <a:ext uri="{28A0092B-C50C-407E-A947-70E740481C1C}">
-                <a14:useLocalDpi xmlns:a14="http://schemas.microsoft.com/office/drawing/2010/main" val="0"/>
-              </a:ext>
-            </a:extLst>
-          </a:blip>
-          <a:srcRect/>
-          <a:stretch/>
-        </p:blipFill>
-        <p:spPr>
-          <a:xfrm>
-            <a:off x="-1" y="1"/>
-            <a:ext cx="4635315" cy="6857999"/>
-          </a:xfrm>
-          <a:prstGeom prst="rect">
-            <a:avLst/>
-          </a:prstGeom>
-        </p:spPr>
-      </p:pic>
-      <p:cxnSp>
-        <p:nvCxnSpPr>
-          <p:cNvPr id="24" name="Straight Connector 23">
-            <a:extLst>
-              <a:ext uri="{FF2B5EF4-FFF2-40B4-BE49-F238E27FC236}">
-                <a16:creationId xmlns:a16="http://schemas.microsoft.com/office/drawing/2014/main" id="{E7A7CD63-7EC3-44F3-95D0-595C4019FF24}"/>
-              </a:ext>
-              <a:ext uri="{C183D7F6-B498-43B3-948B-1728B52AA6E4}">
-                <adec:decorative xmlns:adec="http://schemas.microsoft.com/office/drawing/2017/decorative" val="1"/>
-              </a:ext>
-            </a:extLst>
-          </p:cNvPr>
-          <p:cNvCxnSpPr>
-            <a:cxnSpLocks noGrp="1" noRot="1" noChangeAspect="1" noMove="1" noResize="1" noEditPoints="1" noAdjustHandles="1" noChangeArrowheads="1" noChangeShapeType="1"/>
-          </p:cNvCxnSpPr>
-          <p:nvPr>
-            <p:extLst>
-              <p:ext uri="{386F3935-93C4-4BCD-93E2-E3B085C9AB24}">
-                <p16:designElem xmlns:p16="http://schemas.microsoft.com/office/powerpoint/2015/main" val="1"/>
-              </p:ext>
-            </p:extLst>
-          </p:nvPr>
-        </p:nvCxnSpPr>
-        <p:spPr>
-          <a:xfrm>
-            <a:off x="5427754" y="4498925"/>
-            <a:ext cx="5636107" cy="0"/>
-          </a:xfrm>
-          <a:prstGeom prst="line">
-            <a:avLst/>
-          </a:prstGeom>
-          <a:ln w="12700">
-            <a:solidFill>
-              <a:schemeClr val="tx1">
-                <a:lumMod val="75000"/>
-                <a:lumOff val="25000"/>
-              </a:schemeClr>
-            </a:solidFill>
-          </a:ln>
-        </p:spPr>
-        <p:style>
-          <a:lnRef idx="1">
-            <a:schemeClr val="accent1"/>
-          </a:lnRef>
-          <a:fillRef idx="0">
-            <a:schemeClr val="accent1"/>
-          </a:fillRef>
-          <a:effectRef idx="0">
-            <a:schemeClr val="accent1"/>
-          </a:effectRef>
-          <a:fontRef idx="minor">
-            <a:schemeClr val="tx1"/>
-          </a:fontRef>
-        </p:style>
-      </p:cxnSp>
-    </p:spTree>
-    <p:extLst>
-      <p:ext uri="{BB962C8B-B14F-4D97-AF65-F5344CB8AC3E}">
-        <p14:creationId xmlns:p14="http://schemas.microsoft.com/office/powerpoint/2010/main" val="36225148"/>
-      </p:ext>
-    </p:extLst>
-  </p:cSld>
-  <p:clrMapOvr>
-    <a:masterClrMapping/>
-  </p:clrMapOvr>
-</p:sld>
-</file>
-
-<file path=ppt/slides/slide3.xml><?xml version="1.0" encoding="utf-8"?>
-<p:sld xmlns:a="http://schemas.openxmlformats.org/drawingml/2006/main" xmlns:r="http://schemas.openxmlformats.org/officeDocument/2006/relationships" xmlns:p="http://schemas.openxmlformats.org/presentationml/2006/main">
-  <p:cSld>
-    <p:bg>
-      <p:bgPr>
-        <a:solidFill>
-          <a:schemeClr val="bg1"/>
-        </a:solidFill>
-        <a:effectLst/>
-      </p:bgPr>
-    </p:bg>
-    <p:spTree>
-      <p:nvGrpSpPr>
-        <p:cNvPr id="1" name=""/>
-        <p:cNvGrpSpPr/>
-        <p:nvPr/>
-      </p:nvGrpSpPr>
-      <p:grpSpPr>
-        <a:xfrm>
-          <a:off x="0" y="0"/>
-          <a:ext cx="0" cy="0"/>
-          <a:chOff x="0" y="0"/>
-          <a:chExt cx="0" cy="0"/>
-        </a:xfrm>
-      </p:grpSpPr>
-      <p:sp useBgFill="1">
-        <p:nvSpPr>
-          <p:cNvPr id="22" name="Rectangle 21">
-            <a:extLst>
-              <a:ext uri="{FF2B5EF4-FFF2-40B4-BE49-F238E27FC236}">
-                <a16:creationId xmlns:a16="http://schemas.microsoft.com/office/drawing/2014/main" id="{A9286AD2-18A9-4868-A4E3-7A2097A20810}"/>
-              </a:ext>
-              <a:ext uri="{C183D7F6-B498-43B3-948B-1728B52AA6E4}">
-                <adec:decorative xmlns:adec="http://schemas.microsoft.com/office/drawing/2017/decorative" val="1"/>
-              </a:ext>
-            </a:extLst>
-          </p:cNvPr>
-          <p:cNvSpPr>
-            <a:spLocks noGrp="1" noRot="1" noChangeAspect="1" noMove="1" noResize="1" noEditPoints="1" noAdjustHandles="1" noChangeArrowheads="1" noChangeShapeType="1" noTextEdit="1"/>
-          </p:cNvSpPr>
-          <p:nvPr>
-            <p:extLst>
-              <p:ext uri="{386F3935-93C4-4BCD-93E2-E3B085C9AB24}">
-                <p16:designElem xmlns:p16="http://schemas.microsoft.com/office/powerpoint/2015/main" val="1"/>
-              </p:ext>
-            </p:extLst>
-          </p:nvPr>
-        </p:nvSpPr>
-        <p:spPr>
-          <a:xfrm>
-            <a:off x="0" y="1"/>
-            <a:ext cx="12192001" cy="6857999"/>
-          </a:xfrm>
-          <a:prstGeom prst="rect">
-            <a:avLst/>
-          </a:prstGeom>
-          <a:ln>
-            <a:noFill/>
-          </a:ln>
-        </p:spPr>
-        <p:style>
-          <a:lnRef idx="2">
-            <a:schemeClr val="accent1">
-              <a:shade val="50000"/>
-            </a:schemeClr>
-          </a:lnRef>
-          <a:fillRef idx="1">
-            <a:schemeClr val="accent1"/>
-          </a:fillRef>
-          <a:effectRef idx="0">
-            <a:schemeClr val="accent1"/>
-          </a:effectRef>
-          <a:fontRef idx="minor">
-            <a:schemeClr val="lt1"/>
-          </a:fontRef>
-        </p:style>
-        <p:txBody>
-          <a:bodyPr rtlCol="0" anchor="ctr"/>
-          <a:lstStyle/>
-          <a:p>
-            <a:pPr algn="ctr"/>
-            <a:endParaRPr lang="en-US"/>
-          </a:p>
-        </p:txBody>
-      </p:sp>
-      <p:sp>
-        <p:nvSpPr>
-          <p:cNvPr id="2" name="Title 1">
-            <a:extLst>
-              <a:ext uri="{FF2B5EF4-FFF2-40B4-BE49-F238E27FC236}">
-                <a16:creationId xmlns:a16="http://schemas.microsoft.com/office/drawing/2014/main" id="{78FD68DA-43BA-4508-8DE2-BA9BB7B2FA5B}"/>
-              </a:ext>
-            </a:extLst>
-          </p:cNvPr>
-          <p:cNvSpPr>
-            <a:spLocks noGrp="1"/>
-          </p:cNvSpPr>
-          <p:nvPr>
-            <p:ph type="ctrTitle"/>
-          </p:nvPr>
-        </p:nvSpPr>
-        <p:spPr>
-          <a:xfrm>
             <a:off x="5474312" y="580374"/>
             <a:ext cx="6253317" cy="3686015"/>
           </a:xfrm>
         </p:spPr>
         <p:txBody>
           <a:bodyPr>
-            <a:normAutofit/>
+            <a:normAutofit fontScale="90000"/>
           </a:bodyPr>
           <a:lstStyle/>
           <a:p>
             <a:pPr algn="ctr"/>
-            <a:r>
+            <a:br>
               <a:rPr lang="en-US" sz="8000" dirty="0"/>
-              <a:t>Developed by:</a:t>
-            </a:r>
+            </a:br>
+            <a:br>
+              <a:rPr lang="en-US" sz="8000" dirty="0"/>
+            </a:br>
+            <a:br>
+              <a:rPr lang="en-US" sz="8000" dirty="0"/>
+            </a:br>
             <a:br>
               <a:rPr lang="en-US" sz="8000" dirty="0"/>
             </a:br>
@@ -4507,7 +4299,7 @@
         </p:blipFill>
         <p:spPr bwMode="auto">
           <a:xfrm>
-            <a:off x="6785721" y="3009698"/>
+            <a:off x="6466940" y="205054"/>
             <a:ext cx="3255873" cy="1372959"/>
           </a:xfrm>
           <a:prstGeom prst="rect">
@@ -4634,10 +4426,602 @@
           </a:p>
         </p:txBody>
       </p:sp>
+      <p:sp>
+        <p:nvSpPr>
+          <p:cNvPr id="21" name="TextBox 20">
+            <a:extLst>
+              <a:ext uri="{FF2B5EF4-FFF2-40B4-BE49-F238E27FC236}">
+                <a16:creationId xmlns:a16="http://schemas.microsoft.com/office/drawing/2014/main" id="{DAA230D8-9665-4227-B9FC-1F889512CE8A}"/>
+              </a:ext>
+            </a:extLst>
+          </p:cNvPr>
+          <p:cNvSpPr txBox="1"/>
+          <p:nvPr/>
+        </p:nvSpPr>
+        <p:spPr>
+          <a:xfrm>
+            <a:off x="5501960" y="3852594"/>
+            <a:ext cx="1174459" cy="646331"/>
+          </a:xfrm>
+          <a:prstGeom prst="rect">
+            <a:avLst/>
+          </a:prstGeom>
+          <a:noFill/>
+        </p:spPr>
+        <p:txBody>
+          <a:bodyPr wrap="square" rtlCol="0">
+            <a:spAutoFit/>
+          </a:bodyPr>
+          <a:lstStyle/>
+          <a:p>
+            <a:pPr algn="ctr"/>
+            <a:r>
+              <a:rPr lang="en-CA" dirty="0"/>
+              <a:t>Sandy MacAskill</a:t>
+            </a:r>
+          </a:p>
+        </p:txBody>
+      </p:sp>
+      <p:sp>
+        <p:nvSpPr>
+          <p:cNvPr id="23" name="TextBox 22">
+            <a:extLst>
+              <a:ext uri="{FF2B5EF4-FFF2-40B4-BE49-F238E27FC236}">
+                <a16:creationId xmlns:a16="http://schemas.microsoft.com/office/drawing/2014/main" id="{37D06949-076D-47FC-BEA3-F11B0A9A6ABC}"/>
+              </a:ext>
+            </a:extLst>
+          </p:cNvPr>
+          <p:cNvSpPr txBox="1"/>
+          <p:nvPr/>
+        </p:nvSpPr>
+        <p:spPr>
+          <a:xfrm>
+            <a:off x="7473982" y="3896909"/>
+            <a:ext cx="1409350" cy="646331"/>
+          </a:xfrm>
+          <a:prstGeom prst="rect">
+            <a:avLst/>
+          </a:prstGeom>
+          <a:noFill/>
+        </p:spPr>
+        <p:txBody>
+          <a:bodyPr wrap="square" rtlCol="0">
+            <a:spAutoFit/>
+          </a:bodyPr>
+          <a:lstStyle/>
+          <a:p>
+            <a:pPr algn="ctr"/>
+            <a:r>
+              <a:rPr lang="en-CA" dirty="0"/>
+              <a:t>Felipe Mafra </a:t>
+            </a:r>
+          </a:p>
+          <a:p>
+            <a:pPr algn="ctr"/>
+            <a:r>
+              <a:rPr lang="en-CA" dirty="0"/>
+              <a:t>Dos Santos</a:t>
+            </a:r>
+          </a:p>
+        </p:txBody>
+      </p:sp>
+      <p:sp>
+        <p:nvSpPr>
+          <p:cNvPr id="25" name="TextBox 24">
+            <a:extLst>
+              <a:ext uri="{FF2B5EF4-FFF2-40B4-BE49-F238E27FC236}">
+                <a16:creationId xmlns:a16="http://schemas.microsoft.com/office/drawing/2014/main" id="{6E01CE22-BDBA-4BD5-8EE6-BEFCD31795BF}"/>
+              </a:ext>
+            </a:extLst>
+          </p:cNvPr>
+          <p:cNvSpPr txBox="1"/>
+          <p:nvPr/>
+        </p:nvSpPr>
+        <p:spPr>
+          <a:xfrm>
+            <a:off x="9824973" y="3896909"/>
+            <a:ext cx="1174459" cy="646331"/>
+          </a:xfrm>
+          <a:prstGeom prst="rect">
+            <a:avLst/>
+          </a:prstGeom>
+          <a:noFill/>
+        </p:spPr>
+        <p:txBody>
+          <a:bodyPr wrap="square" rtlCol="0">
+            <a:spAutoFit/>
+          </a:bodyPr>
+          <a:lstStyle/>
+          <a:p>
+            <a:pPr algn="ctr"/>
+            <a:r>
+              <a:rPr lang="en-CA" dirty="0" err="1"/>
+              <a:t>Jemillee</a:t>
+            </a:r>
+            <a:r>
+              <a:rPr lang="en-CA" dirty="0"/>
+              <a:t> Prado</a:t>
+            </a:r>
+          </a:p>
+        </p:txBody>
+      </p:sp>
+      <p:pic>
+        <p:nvPicPr>
+          <p:cNvPr id="26" name="Picture 25">
+            <a:extLst>
+              <a:ext uri="{FF2B5EF4-FFF2-40B4-BE49-F238E27FC236}">
+                <a16:creationId xmlns:a16="http://schemas.microsoft.com/office/drawing/2014/main" id="{D8C2C820-48F3-44AB-851E-E77C167F9FC8}"/>
+              </a:ext>
+            </a:extLst>
+          </p:cNvPr>
+          <p:cNvPicPr>
+            <a:picLocks noChangeAspect="1"/>
+          </p:cNvPicPr>
+          <p:nvPr/>
+        </p:nvPicPr>
+        <p:blipFill>
+          <a:blip r:embed="rId4">
+            <a:extLst>
+              <a:ext uri="{28A0092B-C50C-407E-A947-70E740481C1C}">
+                <a14:useLocalDpi xmlns:a14="http://schemas.microsoft.com/office/drawing/2010/main" val="0"/>
+              </a:ext>
+            </a:extLst>
+          </a:blip>
+          <a:stretch>
+            <a:fillRect/>
+          </a:stretch>
+        </p:blipFill>
+        <p:spPr>
+          <a:xfrm>
+            <a:off x="7302507" y="1544541"/>
+            <a:ext cx="1752299" cy="2336398"/>
+          </a:xfrm>
+          <a:prstGeom prst="rect">
+            <a:avLst/>
+          </a:prstGeom>
+        </p:spPr>
+      </p:pic>
+      <p:pic>
+        <p:nvPicPr>
+          <p:cNvPr id="27" name="Picture 26">
+            <a:extLst>
+              <a:ext uri="{FF2B5EF4-FFF2-40B4-BE49-F238E27FC236}">
+                <a16:creationId xmlns:a16="http://schemas.microsoft.com/office/drawing/2014/main" id="{0DE49B97-1D25-4AFF-A7D7-B0BC2566F0E0}"/>
+              </a:ext>
+            </a:extLst>
+          </p:cNvPr>
+          <p:cNvPicPr>
+            <a:picLocks noChangeAspect="1"/>
+          </p:cNvPicPr>
+          <p:nvPr/>
+        </p:nvPicPr>
+        <p:blipFill>
+          <a:blip r:embed="rId5">
+            <a:extLst>
+              <a:ext uri="{28A0092B-C50C-407E-A947-70E740481C1C}">
+                <a14:useLocalDpi xmlns:a14="http://schemas.microsoft.com/office/drawing/2010/main" val="0"/>
+              </a:ext>
+            </a:extLst>
+          </a:blip>
+          <a:stretch>
+            <a:fillRect/>
+          </a:stretch>
+        </p:blipFill>
+        <p:spPr>
+          <a:xfrm>
+            <a:off x="9515087" y="1560511"/>
+            <a:ext cx="1752299" cy="2336398"/>
+          </a:xfrm>
+          <a:prstGeom prst="rect">
+            <a:avLst/>
+          </a:prstGeom>
+        </p:spPr>
+      </p:pic>
+      <p:pic>
+        <p:nvPicPr>
+          <p:cNvPr id="28" name="Picture 27">
+            <a:extLst>
+              <a:ext uri="{FF2B5EF4-FFF2-40B4-BE49-F238E27FC236}">
+                <a16:creationId xmlns:a16="http://schemas.microsoft.com/office/drawing/2014/main" id="{3E60AB19-5369-4B1F-A664-F86918FAD9FB}"/>
+              </a:ext>
+            </a:extLst>
+          </p:cNvPr>
+          <p:cNvPicPr>
+            <a:picLocks noChangeAspect="1"/>
+          </p:cNvPicPr>
+          <p:nvPr/>
+        </p:nvPicPr>
+        <p:blipFill>
+          <a:blip r:embed="rId6">
+            <a:extLst>
+              <a:ext uri="{28A0092B-C50C-407E-A947-70E740481C1C}">
+                <a14:useLocalDpi xmlns:a14="http://schemas.microsoft.com/office/drawing/2010/main" val="0"/>
+              </a:ext>
+            </a:extLst>
+          </a:blip>
+          <a:stretch>
+            <a:fillRect/>
+          </a:stretch>
+        </p:blipFill>
+        <p:spPr>
+          <a:xfrm>
+            <a:off x="5117062" y="1615744"/>
+            <a:ext cx="1751242" cy="2152903"/>
+          </a:xfrm>
+          <a:prstGeom prst="rect">
+            <a:avLst/>
+          </a:prstGeom>
+        </p:spPr>
+      </p:pic>
+      <p:sp>
+        <p:nvSpPr>
+          <p:cNvPr id="29" name="Title 1">
+            <a:extLst>
+              <a:ext uri="{FF2B5EF4-FFF2-40B4-BE49-F238E27FC236}">
+                <a16:creationId xmlns:a16="http://schemas.microsoft.com/office/drawing/2014/main" id="{CB7BA86A-D439-42C0-B934-47DD10C2B752}"/>
+              </a:ext>
+            </a:extLst>
+          </p:cNvPr>
+          <p:cNvSpPr txBox="1">
+            <a:spLocks/>
+          </p:cNvSpPr>
+          <p:nvPr/>
+        </p:nvSpPr>
+        <p:spPr>
+          <a:xfrm>
+            <a:off x="5162439" y="2290779"/>
+            <a:ext cx="6253317" cy="3686015"/>
+          </a:xfrm>
+          <a:prstGeom prst="rect">
+            <a:avLst/>
+          </a:prstGeom>
+        </p:spPr>
+        <p:txBody>
+          <a:bodyPr vert="horz" lIns="91440" tIns="45720" rIns="91440" bIns="45720" rtlCol="0" anchor="b">
+            <a:normAutofit fontScale="97500"/>
+          </a:bodyPr>
+          <a:lstStyle>
+            <a:lvl1pPr algn="l" defTabSz="914400" rtl="0" eaLnBrk="1" latinLnBrk="0" hangingPunct="1">
+              <a:lnSpc>
+                <a:spcPct val="90000"/>
+              </a:lnSpc>
+              <a:spcBef>
+                <a:spcPct val="0"/>
+              </a:spcBef>
+              <a:buNone/>
+              <a:defRPr sz="8000" i="0" kern="1200" spc="-50" baseline="0">
+                <a:solidFill>
+                  <a:schemeClr val="tx1">
+                    <a:lumMod val="85000"/>
+                    <a:lumOff val="15000"/>
+                  </a:schemeClr>
+                </a:solidFill>
+                <a:latin typeface="+mj-lt"/>
+                <a:ea typeface="+mj-ea"/>
+                <a:cs typeface="+mj-cs"/>
+              </a:defRPr>
+            </a:lvl1pPr>
+          </a:lstStyle>
+          <a:p>
+            <a:pPr algn="ctr"/>
+            <a:r>
+              <a:rPr lang="en-US" sz="3600" dirty="0"/>
+              <a:t>Mentored by:</a:t>
+            </a:r>
+            <a:br>
+              <a:rPr lang="en-US" sz="3600" dirty="0"/>
+            </a:br>
+            <a:r>
+              <a:rPr lang="en-US" sz="3600" dirty="0"/>
+              <a:t>Sonam Devgan</a:t>
+            </a:r>
+          </a:p>
+        </p:txBody>
+      </p:sp>
     </p:spTree>
     <p:extLst>
       <p:ext uri="{BB962C8B-B14F-4D97-AF65-F5344CB8AC3E}">
         <p14:creationId xmlns:p14="http://schemas.microsoft.com/office/powerpoint/2010/main" val="3549675491"/>
+      </p:ext>
+    </p:extLst>
+  </p:cSld>
+  <p:clrMapOvr>
+    <a:masterClrMapping/>
+  </p:clrMapOvr>
+</p:sld>
+</file>
+
+<file path=ppt/slides/slide3.xml><?xml version="1.0" encoding="utf-8"?>
+<p:sld xmlns:a="http://schemas.openxmlformats.org/drawingml/2006/main" xmlns:r="http://schemas.openxmlformats.org/officeDocument/2006/relationships" xmlns:p="http://schemas.openxmlformats.org/presentationml/2006/main">
+  <p:cSld>
+    <p:bg>
+      <p:bgPr>
+        <a:solidFill>
+          <a:schemeClr val="bg1"/>
+        </a:solidFill>
+        <a:effectLst/>
+      </p:bgPr>
+    </p:bg>
+    <p:spTree>
+      <p:nvGrpSpPr>
+        <p:cNvPr id="1" name=""/>
+        <p:cNvGrpSpPr/>
+        <p:nvPr/>
+      </p:nvGrpSpPr>
+      <p:grpSpPr>
+        <a:xfrm>
+          <a:off x="0" y="0"/>
+          <a:ext cx="0" cy="0"/>
+          <a:chOff x="0" y="0"/>
+          <a:chExt cx="0" cy="0"/>
+        </a:xfrm>
+      </p:grpSpPr>
+      <p:sp useBgFill="1">
+        <p:nvSpPr>
+          <p:cNvPr id="22" name="Rectangle 21">
+            <a:extLst>
+              <a:ext uri="{FF2B5EF4-FFF2-40B4-BE49-F238E27FC236}">
+                <a16:creationId xmlns:a16="http://schemas.microsoft.com/office/drawing/2014/main" id="{A9286AD2-18A9-4868-A4E3-7A2097A20810}"/>
+              </a:ext>
+              <a:ext uri="{C183D7F6-B498-43B3-948B-1728B52AA6E4}">
+                <adec:decorative xmlns:adec="http://schemas.microsoft.com/office/drawing/2017/decorative" val="1"/>
+              </a:ext>
+            </a:extLst>
+          </p:cNvPr>
+          <p:cNvSpPr>
+            <a:spLocks noGrp="1" noRot="1" noChangeAspect="1" noMove="1" noResize="1" noEditPoints="1" noAdjustHandles="1" noChangeArrowheads="1" noChangeShapeType="1" noTextEdit="1"/>
+          </p:cNvSpPr>
+          <p:nvPr>
+            <p:extLst>
+              <p:ext uri="{386F3935-93C4-4BCD-93E2-E3B085C9AB24}">
+                <p16:designElem xmlns:p16="http://schemas.microsoft.com/office/powerpoint/2015/main" val="1"/>
+              </p:ext>
+            </p:extLst>
+          </p:nvPr>
+        </p:nvSpPr>
+        <p:spPr>
+          <a:xfrm>
+            <a:off x="0" y="1"/>
+            <a:ext cx="12192001" cy="6857999"/>
+          </a:xfrm>
+          <a:prstGeom prst="rect">
+            <a:avLst/>
+          </a:prstGeom>
+          <a:ln>
+            <a:noFill/>
+          </a:ln>
+        </p:spPr>
+        <p:style>
+          <a:lnRef idx="2">
+            <a:schemeClr val="accent1">
+              <a:shade val="50000"/>
+            </a:schemeClr>
+          </a:lnRef>
+          <a:fillRef idx="1">
+            <a:schemeClr val="accent1"/>
+          </a:fillRef>
+          <a:effectRef idx="0">
+            <a:schemeClr val="accent1"/>
+          </a:effectRef>
+          <a:fontRef idx="minor">
+            <a:schemeClr val="lt1"/>
+          </a:fontRef>
+        </p:style>
+        <p:txBody>
+          <a:bodyPr rtlCol="0" anchor="ctr"/>
+          <a:lstStyle/>
+          <a:p>
+            <a:pPr algn="ctr"/>
+            <a:endParaRPr lang="en-US"/>
+          </a:p>
+        </p:txBody>
+      </p:sp>
+      <p:sp>
+        <p:nvSpPr>
+          <p:cNvPr id="2" name="Title 1">
+            <a:extLst>
+              <a:ext uri="{FF2B5EF4-FFF2-40B4-BE49-F238E27FC236}">
+                <a16:creationId xmlns:a16="http://schemas.microsoft.com/office/drawing/2014/main" id="{78FD68DA-43BA-4508-8DE2-BA9BB7B2FA5B}"/>
+              </a:ext>
+            </a:extLst>
+          </p:cNvPr>
+          <p:cNvSpPr>
+            <a:spLocks noGrp="1"/>
+          </p:cNvSpPr>
+          <p:nvPr>
+            <p:ph type="ctrTitle"/>
+          </p:nvPr>
+        </p:nvSpPr>
+        <p:spPr>
+          <a:xfrm>
+            <a:off x="5286999" y="2359075"/>
+            <a:ext cx="6253317" cy="2582271"/>
+          </a:xfrm>
+        </p:spPr>
+        <p:txBody>
+          <a:bodyPr>
+            <a:normAutofit fontScale="90000"/>
+          </a:bodyPr>
+          <a:lstStyle/>
+          <a:p>
+            <a:pPr algn="ctr"/>
+            <a:r>
+              <a:rPr lang="en-US" sz="6000" dirty="0"/>
+              <a:t>Organize and Update your inventory system today!</a:t>
+            </a:r>
+            <a:br>
+              <a:rPr lang="en-US" sz="6000" dirty="0"/>
+            </a:br>
+            <a:br>
+              <a:rPr lang="en-US" sz="6000" dirty="0"/>
+            </a:br>
+            <a:endParaRPr lang="en-US" sz="6000" dirty="0"/>
+          </a:p>
+        </p:txBody>
+      </p:sp>
+      <p:pic>
+        <p:nvPicPr>
+          <p:cNvPr id="5" name="Picture 4" descr="A picture containing building, sitting, bench, side&#10;&#10;Description automatically generated">
+            <a:extLst>
+              <a:ext uri="{FF2B5EF4-FFF2-40B4-BE49-F238E27FC236}">
+                <a16:creationId xmlns:a16="http://schemas.microsoft.com/office/drawing/2014/main" id="{282CF6DD-7FE8-4063-9551-1B7BBCE92ABE}"/>
+              </a:ext>
+            </a:extLst>
+          </p:cNvPr>
+          <p:cNvPicPr>
+            <a:picLocks noChangeAspect="1"/>
+          </p:cNvPicPr>
+          <p:nvPr/>
+        </p:nvPicPr>
+        <p:blipFill rotWithShape="1">
+          <a:blip r:embed="rId2">
+            <a:extLst>
+              <a:ext uri="{28A0092B-C50C-407E-A947-70E740481C1C}">
+                <a14:useLocalDpi xmlns:a14="http://schemas.microsoft.com/office/drawing/2010/main" val="0"/>
+              </a:ext>
+            </a:extLst>
+          </a:blip>
+          <a:srcRect/>
+          <a:stretch/>
+        </p:blipFill>
+        <p:spPr>
+          <a:xfrm>
+            <a:off x="-1" y="1"/>
+            <a:ext cx="4635315" cy="6857999"/>
+          </a:xfrm>
+          <a:prstGeom prst="rect">
+            <a:avLst/>
+          </a:prstGeom>
+        </p:spPr>
+      </p:pic>
+      <p:cxnSp>
+        <p:nvCxnSpPr>
+          <p:cNvPr id="24" name="Straight Connector 23">
+            <a:extLst>
+              <a:ext uri="{FF2B5EF4-FFF2-40B4-BE49-F238E27FC236}">
+                <a16:creationId xmlns:a16="http://schemas.microsoft.com/office/drawing/2014/main" id="{E7A7CD63-7EC3-44F3-95D0-595C4019FF24}"/>
+              </a:ext>
+              <a:ext uri="{C183D7F6-B498-43B3-948B-1728B52AA6E4}">
+                <adec:decorative xmlns:adec="http://schemas.microsoft.com/office/drawing/2017/decorative" val="1"/>
+              </a:ext>
+            </a:extLst>
+          </p:cNvPr>
+          <p:cNvCxnSpPr>
+            <a:cxnSpLocks noGrp="1" noRot="1" noChangeAspect="1" noMove="1" noResize="1" noEditPoints="1" noAdjustHandles="1" noChangeArrowheads="1" noChangeShapeType="1"/>
+          </p:cNvCxnSpPr>
+          <p:nvPr>
+            <p:extLst>
+              <p:ext uri="{386F3935-93C4-4BCD-93E2-E3B085C9AB24}">
+                <p16:designElem xmlns:p16="http://schemas.microsoft.com/office/powerpoint/2015/main" val="1"/>
+              </p:ext>
+            </p:extLst>
+          </p:nvPr>
+        </p:nvCxnSpPr>
+        <p:spPr>
+          <a:xfrm>
+            <a:off x="5427754" y="4498925"/>
+            <a:ext cx="5636107" cy="0"/>
+          </a:xfrm>
+          <a:prstGeom prst="line">
+            <a:avLst/>
+          </a:prstGeom>
+          <a:ln w="12700">
+            <a:solidFill>
+              <a:schemeClr val="tx1">
+                <a:lumMod val="75000"/>
+                <a:lumOff val="25000"/>
+              </a:schemeClr>
+            </a:solidFill>
+          </a:ln>
+        </p:spPr>
+        <p:style>
+          <a:lnRef idx="1">
+            <a:schemeClr val="accent1"/>
+          </a:lnRef>
+          <a:fillRef idx="0">
+            <a:schemeClr val="accent1"/>
+          </a:fillRef>
+          <a:effectRef idx="0">
+            <a:schemeClr val="accent1"/>
+          </a:effectRef>
+          <a:fontRef idx="minor">
+            <a:schemeClr val="tx1"/>
+          </a:fontRef>
+        </p:style>
+      </p:cxnSp>
+      <p:sp>
+        <p:nvSpPr>
+          <p:cNvPr id="6" name="TextBox 5">
+            <a:extLst>
+              <a:ext uri="{FF2B5EF4-FFF2-40B4-BE49-F238E27FC236}">
+                <a16:creationId xmlns:a16="http://schemas.microsoft.com/office/drawing/2014/main" id="{E4B4B2C1-149B-4065-AA87-DB4F7A16AF10}"/>
+              </a:ext>
+            </a:extLst>
+          </p:cNvPr>
+          <p:cNvSpPr txBox="1"/>
+          <p:nvPr/>
+        </p:nvSpPr>
+        <p:spPr>
+          <a:xfrm>
+            <a:off x="5427754" y="3540962"/>
+            <a:ext cx="5712826" cy="1569660"/>
+          </a:xfrm>
+          <a:prstGeom prst="rect">
+            <a:avLst/>
+          </a:prstGeom>
+          <a:noFill/>
+        </p:spPr>
+        <p:txBody>
+          <a:bodyPr wrap="square" rtlCol="0">
+            <a:spAutoFit/>
+          </a:bodyPr>
+          <a:lstStyle/>
+          <a:p>
+            <a:pPr marL="285750" indent="-285750">
+              <a:buFontTx/>
+              <a:buChar char="-"/>
+            </a:pPr>
+            <a:r>
+              <a:rPr lang="en-CA" sz="2000" dirty="0"/>
+              <a:t>Find products quickly and easily</a:t>
+            </a:r>
+          </a:p>
+          <a:p>
+            <a:pPr marL="285750" indent="-285750">
+              <a:buFontTx/>
+              <a:buChar char="-"/>
+            </a:pPr>
+            <a:r>
+              <a:rPr lang="en-CA" sz="2000" dirty="0"/>
+              <a:t>Keep customers happy and informed</a:t>
+            </a:r>
+          </a:p>
+          <a:p>
+            <a:pPr marL="285750" indent="-285750">
+              <a:buFontTx/>
+              <a:buChar char="-"/>
+            </a:pPr>
+            <a:r>
+              <a:rPr lang="en-CA" sz="2000" dirty="0"/>
+              <a:t>Cut down on time waste at multiple locations</a:t>
+            </a:r>
+          </a:p>
+          <a:p>
+            <a:endParaRPr lang="en-CA" dirty="0"/>
+          </a:p>
+          <a:p>
+            <a:pPr marL="285750" indent="-285750">
+              <a:buFontTx/>
+              <a:buChar char="-"/>
+            </a:pPr>
+            <a:endParaRPr lang="en-CA" dirty="0"/>
+          </a:p>
+        </p:txBody>
+      </p:sp>
+    </p:spTree>
+    <p:extLst>
+      <p:ext uri="{BB962C8B-B14F-4D97-AF65-F5344CB8AC3E}">
+        <p14:creationId xmlns:p14="http://schemas.microsoft.com/office/powerpoint/2010/main" val="3319009500"/>
       </p:ext>
     </p:extLst>
   </p:cSld>
@@ -4750,25 +5134,55 @@
         </p:nvSpPr>
         <p:spPr>
           <a:xfrm>
-            <a:off x="5204606" y="-1131140"/>
-            <a:ext cx="6253317" cy="3686015"/>
+            <a:off x="5286999" y="3429000"/>
+            <a:ext cx="6253317" cy="2582271"/>
           </a:xfrm>
         </p:spPr>
         <p:txBody>
           <a:bodyPr>
-            <a:normAutofit/>
+            <a:normAutofit fontScale="90000"/>
           </a:bodyPr>
           <a:lstStyle/>
           <a:p>
             <a:pPr algn="ctr"/>
             <a:r>
-              <a:rPr lang="en-US" sz="8000" dirty="0"/>
-              <a:t>Developers:</a:t>
+              <a:rPr lang="en-CA" sz="6000" dirty="0"/>
+              <a:t>Featuring:</a:t>
             </a:r>
             <a:br>
-              <a:rPr lang="en-US" sz="8000" dirty="0"/>
+              <a:rPr lang="en-CA" sz="6000" dirty="0"/>
             </a:br>
-            <a:endParaRPr lang="en-US" sz="8000" dirty="0"/>
+            <a:r>
+              <a:rPr lang="en-CA" sz="6000" dirty="0"/>
+              <a:t>SQL Server</a:t>
+            </a:r>
+            <a:br>
+              <a:rPr lang="en-CA" sz="6000" dirty="0"/>
+            </a:br>
+            <a:r>
+              <a:rPr lang="en-CA" sz="6000" dirty="0" err="1"/>
+              <a:t>ASP.Net</a:t>
+            </a:r>
+            <a:br>
+              <a:rPr lang="en-CA" sz="6000" dirty="0"/>
+            </a:br>
+            <a:r>
+              <a:rPr lang="en-CA" sz="6000" dirty="0"/>
+              <a:t>HTML5, CSS3, </a:t>
+            </a:r>
+            <a:r>
+              <a:rPr lang="en-CA" sz="6000" dirty="0" err="1"/>
+              <a:t>Javascript</a:t>
+            </a:r>
+            <a:r>
+              <a:rPr lang="en-CA" sz="6000" dirty="0"/>
+              <a:t> and </a:t>
+            </a:r>
+            <a:r>
+              <a:rPr lang="en-CA" sz="6000" dirty="0" err="1"/>
+              <a:t>Jquery</a:t>
+            </a:r>
+            <a:endParaRPr lang="en-US" sz="6000" dirty="0"/>
           </a:p>
         </p:txBody>
       </p:sp>
@@ -4862,415 +5276,10 @@
           </a:fontRef>
         </p:style>
       </p:cxnSp>
-      <p:sp>
-        <p:nvSpPr>
-          <p:cNvPr id="3" name="Rectangle 2">
-            <a:extLst>
-              <a:ext uri="{FF2B5EF4-FFF2-40B4-BE49-F238E27FC236}">
-                <a16:creationId xmlns:a16="http://schemas.microsoft.com/office/drawing/2014/main" id="{012B62BB-52D9-4F15-B35E-2A1E0B52126C}"/>
-              </a:ext>
-            </a:extLst>
-          </p:cNvPr>
-          <p:cNvSpPr>
-            <a:spLocks noChangeArrowheads="1"/>
-          </p:cNvSpPr>
-          <p:nvPr/>
-        </p:nvSpPr>
-        <p:spPr bwMode="auto">
-          <a:xfrm>
-            <a:off x="184558" y="-58723"/>
-            <a:ext cx="12192000" cy="457200"/>
-          </a:xfrm>
-          <a:prstGeom prst="rect">
-            <a:avLst/>
-          </a:prstGeom>
-          <a:noFill/>
-          <a:ln>
-            <a:noFill/>
-          </a:ln>
-          <a:effectLst/>
-          <a:extLst>
-            <a:ext uri="{909E8E84-426E-40DD-AFC4-6F175D3DCCD1}">
-              <a14:hiddenFill xmlns:a14="http://schemas.microsoft.com/office/drawing/2010/main">
-                <a:solidFill>
-                  <a:schemeClr val="accent1"/>
-                </a:solidFill>
-              </a14:hiddenFill>
-            </a:ext>
-            <a:ext uri="{91240B29-F687-4F45-9708-019B960494DF}">
-              <a14:hiddenLine xmlns:a14="http://schemas.microsoft.com/office/drawing/2010/main" w="9525">
-                <a:solidFill>
-                  <a:schemeClr val="tx1"/>
-                </a:solidFill>
-                <a:miter lim="800000"/>
-                <a:headEnd/>
-                <a:tailEnd/>
-              </a14:hiddenLine>
-            </a:ext>
-            <a:ext uri="{AF507438-7753-43E0-B8FC-AC1667EBCBE1}">
-              <a14:hiddenEffects xmlns:a14="http://schemas.microsoft.com/office/drawing/2010/main">
-                <a:effectLst>
-                  <a:outerShdw dist="35921" dir="2700000" algn="ctr" rotWithShape="0">
-                    <a:schemeClr val="bg2"/>
-                  </a:outerShdw>
-                </a:effectLst>
-              </a14:hiddenEffects>
-            </a:ext>
-          </a:extLst>
-        </p:spPr>
-        <p:txBody>
-          <a:bodyPr vert="horz" wrap="none" lIns="91440" tIns="45720" rIns="91440" bIns="45720" numCol="1" anchor="ctr" anchorCtr="0" compatLnSpc="1">
-            <a:prstTxWarp prst="textNoShape">
-              <a:avLst/>
-            </a:prstTxWarp>
-            <a:spAutoFit/>
-          </a:bodyPr>
-          <a:lstStyle/>
-          <a:p>
-            <a:endParaRPr lang="en-CA"/>
-          </a:p>
-        </p:txBody>
-      </p:sp>
-      <p:sp>
-        <p:nvSpPr>
-          <p:cNvPr id="4" name="Rectangle 3">
-            <a:extLst>
-              <a:ext uri="{FF2B5EF4-FFF2-40B4-BE49-F238E27FC236}">
-                <a16:creationId xmlns:a16="http://schemas.microsoft.com/office/drawing/2014/main" id="{674771ED-3EEB-415E-B861-8E2C3BFB5650}"/>
-              </a:ext>
-            </a:extLst>
-          </p:cNvPr>
-          <p:cNvSpPr>
-            <a:spLocks noChangeArrowheads="1"/>
-          </p:cNvSpPr>
-          <p:nvPr/>
-        </p:nvSpPr>
-        <p:spPr bwMode="auto">
-          <a:xfrm>
-            <a:off x="184558" y="1065227"/>
-            <a:ext cx="12192000" cy="0"/>
-          </a:xfrm>
-          <a:prstGeom prst="rect">
-            <a:avLst/>
-          </a:prstGeom>
-          <a:noFill/>
-          <a:ln>
-            <a:noFill/>
-          </a:ln>
-          <a:effectLst/>
-          <a:extLst>
-            <a:ext uri="{909E8E84-426E-40DD-AFC4-6F175D3DCCD1}">
-              <a14:hiddenFill xmlns:a14="http://schemas.microsoft.com/office/drawing/2010/main">
-                <a:solidFill>
-                  <a:schemeClr val="accent1"/>
-                </a:solidFill>
-              </a14:hiddenFill>
-            </a:ext>
-            <a:ext uri="{91240B29-F687-4F45-9708-019B960494DF}">
-              <a14:hiddenLine xmlns:a14="http://schemas.microsoft.com/office/drawing/2010/main" w="9525">
-                <a:solidFill>
-                  <a:schemeClr val="tx1"/>
-                </a:solidFill>
-                <a:miter lim="800000"/>
-                <a:headEnd/>
-                <a:tailEnd/>
-              </a14:hiddenLine>
-            </a:ext>
-            <a:ext uri="{AF507438-7753-43E0-B8FC-AC1667EBCBE1}">
-              <a14:hiddenEffects xmlns:a14="http://schemas.microsoft.com/office/drawing/2010/main">
-                <a:effectLst>
-                  <a:outerShdw dist="35921" dir="2700000" algn="ctr" rotWithShape="0">
-                    <a:schemeClr val="bg2"/>
-                  </a:outerShdw>
-                </a:effectLst>
-              </a14:hiddenEffects>
-            </a:ext>
-          </a:extLst>
-        </p:spPr>
-        <p:txBody>
-          <a:bodyPr vert="horz" wrap="none" lIns="91440" tIns="45720" rIns="91440" bIns="45720" numCol="1" anchor="ctr" anchorCtr="0" compatLnSpc="1">
-            <a:prstTxWarp prst="textNoShape">
-              <a:avLst/>
-            </a:prstTxWarp>
-            <a:spAutoFit/>
-          </a:bodyPr>
-          <a:lstStyle/>
-          <a:p>
-            <a:pPr marL="0" marR="0" lvl="0" indent="457200" algn="l" defTabSz="914400" rtl="0" eaLnBrk="0" fontAlgn="base" latinLnBrk="0" hangingPunct="0">
-              <a:lnSpc>
-                <a:spcPct val="100000"/>
-              </a:lnSpc>
-              <a:spcBef>
-                <a:spcPct val="0"/>
-              </a:spcBef>
-              <a:spcAft>
-                <a:spcPct val="0"/>
-              </a:spcAft>
-              <a:buClrTx/>
-              <a:buSzTx/>
-              <a:buFontTx/>
-              <a:buNone/>
-              <a:tabLst/>
-            </a:pPr>
-            <a:r>
-              <a:rPr kumimoji="0" lang="en-US" altLang="en-US" sz="1100" b="0" i="0" u="none" strike="noStrike" cap="none" normalizeH="0" baseline="0">
-                <a:ln>
-                  <a:noFill/>
-                </a:ln>
-                <a:solidFill>
-                  <a:schemeClr val="tx1"/>
-                </a:solidFill>
-                <a:effectLst/>
-                <a:latin typeface="Arial" panose="020B0604020202020204" pitchFamily="34" charset="0"/>
-                <a:ea typeface="Calibri" panose="020F0502020204030204" pitchFamily="34" charset="0"/>
-                <a:cs typeface="Arial" panose="020B0604020202020204" pitchFamily="34" charset="0"/>
-              </a:rPr>
-              <a:t>   </a:t>
-            </a:r>
-            <a:endParaRPr kumimoji="0" lang="en-US" altLang="en-US" sz="1800" b="0" i="0" u="none" strike="noStrike" cap="none" normalizeH="0" baseline="0">
-              <a:ln>
-                <a:noFill/>
-              </a:ln>
-              <a:solidFill>
-                <a:schemeClr val="tx1"/>
-              </a:solidFill>
-              <a:effectLst/>
-              <a:latin typeface="Arial" panose="020B0604020202020204" pitchFamily="34" charset="0"/>
-            </a:endParaRPr>
-          </a:p>
-        </p:txBody>
-      </p:sp>
-      <p:sp>
-        <p:nvSpPr>
-          <p:cNvPr id="6" name="TextBox 5">
-            <a:extLst>
-              <a:ext uri="{FF2B5EF4-FFF2-40B4-BE49-F238E27FC236}">
-                <a16:creationId xmlns:a16="http://schemas.microsoft.com/office/drawing/2014/main" id="{C48B275D-449C-47EF-AEF6-19CAFC67ED7F}"/>
-              </a:ext>
-            </a:extLst>
-          </p:cNvPr>
-          <p:cNvSpPr txBox="1"/>
-          <p:nvPr/>
-        </p:nvSpPr>
-        <p:spPr>
-          <a:xfrm>
-            <a:off x="5501960" y="3852594"/>
-            <a:ext cx="1174459" cy="646331"/>
-          </a:xfrm>
-          <a:prstGeom prst="rect">
-            <a:avLst/>
-          </a:prstGeom>
-          <a:noFill/>
-        </p:spPr>
-        <p:txBody>
-          <a:bodyPr wrap="square" rtlCol="0">
-            <a:spAutoFit/>
-          </a:bodyPr>
-          <a:lstStyle/>
-          <a:p>
-            <a:pPr algn="ctr"/>
-            <a:r>
-              <a:rPr lang="en-CA" dirty="0"/>
-              <a:t>Sandy MacAskill</a:t>
-            </a:r>
-          </a:p>
-        </p:txBody>
-      </p:sp>
-      <p:sp>
-        <p:nvSpPr>
-          <p:cNvPr id="13" name="TextBox 12">
-            <a:extLst>
-              <a:ext uri="{FF2B5EF4-FFF2-40B4-BE49-F238E27FC236}">
-                <a16:creationId xmlns:a16="http://schemas.microsoft.com/office/drawing/2014/main" id="{710DB5A7-357B-4D90-AED9-DDE59130A03C}"/>
-              </a:ext>
-            </a:extLst>
-          </p:cNvPr>
-          <p:cNvSpPr txBox="1"/>
-          <p:nvPr/>
-        </p:nvSpPr>
-        <p:spPr>
-          <a:xfrm>
-            <a:off x="7473982" y="3896909"/>
-            <a:ext cx="1409350" cy="646331"/>
-          </a:xfrm>
-          <a:prstGeom prst="rect">
-            <a:avLst/>
-          </a:prstGeom>
-          <a:noFill/>
-        </p:spPr>
-        <p:txBody>
-          <a:bodyPr wrap="square" rtlCol="0">
-            <a:spAutoFit/>
-          </a:bodyPr>
-          <a:lstStyle/>
-          <a:p>
-            <a:pPr algn="ctr"/>
-            <a:r>
-              <a:rPr lang="en-CA" dirty="0"/>
-              <a:t>Felipe Mafra </a:t>
-            </a:r>
-          </a:p>
-          <a:p>
-            <a:pPr algn="ctr"/>
-            <a:r>
-              <a:rPr lang="en-CA" dirty="0"/>
-              <a:t>Dos Santos</a:t>
-            </a:r>
-          </a:p>
-        </p:txBody>
-      </p:sp>
-      <p:sp>
-        <p:nvSpPr>
-          <p:cNvPr id="14" name="TextBox 13">
-            <a:extLst>
-              <a:ext uri="{FF2B5EF4-FFF2-40B4-BE49-F238E27FC236}">
-                <a16:creationId xmlns:a16="http://schemas.microsoft.com/office/drawing/2014/main" id="{2005B31A-B485-4814-A33A-6F101B433863}"/>
-              </a:ext>
-            </a:extLst>
-          </p:cNvPr>
-          <p:cNvSpPr txBox="1"/>
-          <p:nvPr/>
-        </p:nvSpPr>
-        <p:spPr>
-          <a:xfrm>
-            <a:off x="9824973" y="3896909"/>
-            <a:ext cx="1174459" cy="646331"/>
-          </a:xfrm>
-          <a:prstGeom prst="rect">
-            <a:avLst/>
-          </a:prstGeom>
-          <a:noFill/>
-        </p:spPr>
-        <p:txBody>
-          <a:bodyPr wrap="square" rtlCol="0">
-            <a:spAutoFit/>
-          </a:bodyPr>
-          <a:lstStyle/>
-          <a:p>
-            <a:pPr algn="ctr"/>
-            <a:r>
-              <a:rPr lang="en-CA" dirty="0" err="1"/>
-              <a:t>Jemillee</a:t>
-            </a:r>
-            <a:r>
-              <a:rPr lang="en-CA" dirty="0"/>
-              <a:t> Prado</a:t>
-            </a:r>
-          </a:p>
-        </p:txBody>
-      </p:sp>
-      <p:pic>
-        <p:nvPicPr>
-          <p:cNvPr id="8" name="Picture 7">
-            <a:extLst>
-              <a:ext uri="{FF2B5EF4-FFF2-40B4-BE49-F238E27FC236}">
-                <a16:creationId xmlns:a16="http://schemas.microsoft.com/office/drawing/2014/main" id="{63C07641-737B-4260-9673-62C96A7CA2F7}"/>
-              </a:ext>
-            </a:extLst>
-          </p:cNvPr>
-          <p:cNvPicPr>
-            <a:picLocks noChangeAspect="1"/>
-          </p:cNvPicPr>
-          <p:nvPr/>
-        </p:nvPicPr>
-        <p:blipFill>
-          <a:blip r:embed="rId3">
-            <a:extLst>
-              <a:ext uri="{28A0092B-C50C-407E-A947-70E740481C1C}">
-                <a14:useLocalDpi xmlns:a14="http://schemas.microsoft.com/office/drawing/2010/main" val="0"/>
-              </a:ext>
-            </a:extLst>
-          </a:blip>
-          <a:stretch>
-            <a:fillRect/>
-          </a:stretch>
-        </p:blipFill>
-        <p:spPr>
-          <a:xfrm>
-            <a:off x="7302507" y="1544541"/>
-            <a:ext cx="1752299" cy="2336398"/>
-          </a:xfrm>
-          <a:prstGeom prst="rect">
-            <a:avLst/>
-          </a:prstGeom>
-        </p:spPr>
-      </p:pic>
-      <p:pic>
-        <p:nvPicPr>
-          <p:cNvPr id="10" name="Picture 9">
-            <a:extLst>
-              <a:ext uri="{FF2B5EF4-FFF2-40B4-BE49-F238E27FC236}">
-                <a16:creationId xmlns:a16="http://schemas.microsoft.com/office/drawing/2014/main" id="{63C7BB2C-2375-4E91-BF5A-C07AF2E9E704}"/>
-              </a:ext>
-            </a:extLst>
-          </p:cNvPr>
-          <p:cNvPicPr>
-            <a:picLocks noChangeAspect="1"/>
-          </p:cNvPicPr>
-          <p:nvPr/>
-        </p:nvPicPr>
-        <p:blipFill>
-          <a:blip r:embed="rId4">
-            <a:extLst>
-              <a:ext uri="{28A0092B-C50C-407E-A947-70E740481C1C}">
-                <a14:useLocalDpi xmlns:a14="http://schemas.microsoft.com/office/drawing/2010/main" val="0"/>
-              </a:ext>
-            </a:extLst>
-          </a:blip>
-          <a:stretch>
-            <a:fillRect/>
-          </a:stretch>
-        </p:blipFill>
-        <p:spPr>
-          <a:xfrm>
-            <a:off x="9515087" y="1560511"/>
-            <a:ext cx="1752299" cy="2336398"/>
-          </a:xfrm>
-          <a:prstGeom prst="rect">
-            <a:avLst/>
-          </a:prstGeom>
-        </p:spPr>
-      </p:pic>
-      <p:pic>
-        <p:nvPicPr>
-          <p:cNvPr id="12" name="Picture 11">
-            <a:extLst>
-              <a:ext uri="{FF2B5EF4-FFF2-40B4-BE49-F238E27FC236}">
-                <a16:creationId xmlns:a16="http://schemas.microsoft.com/office/drawing/2014/main" id="{68547B0D-8EB5-49FE-91CD-ABF68B5CCCD0}"/>
-              </a:ext>
-            </a:extLst>
-          </p:cNvPr>
-          <p:cNvPicPr>
-            <a:picLocks noChangeAspect="1"/>
-          </p:cNvPicPr>
-          <p:nvPr/>
-        </p:nvPicPr>
-        <p:blipFill>
-          <a:blip r:embed="rId5">
-            <a:extLst>
-              <a:ext uri="{28A0092B-C50C-407E-A947-70E740481C1C}">
-                <a14:useLocalDpi xmlns:a14="http://schemas.microsoft.com/office/drawing/2010/main" val="0"/>
-              </a:ext>
-            </a:extLst>
-          </a:blip>
-          <a:stretch>
-            <a:fillRect/>
-          </a:stretch>
-        </p:blipFill>
-        <p:spPr>
-          <a:xfrm>
-            <a:off x="5117062" y="1615744"/>
-            <a:ext cx="1751242" cy="2152903"/>
-          </a:xfrm>
-          <a:prstGeom prst="rect">
-            <a:avLst/>
-          </a:prstGeom>
-        </p:spPr>
-      </p:pic>
     </p:spTree>
     <p:extLst>
       <p:ext uri="{BB962C8B-B14F-4D97-AF65-F5344CB8AC3E}">
-        <p14:creationId xmlns:p14="http://schemas.microsoft.com/office/powerpoint/2010/main" val="2771111753"/>
+        <p14:creationId xmlns:p14="http://schemas.microsoft.com/office/powerpoint/2010/main" val="998611654"/>
       </p:ext>
     </p:extLst>
   </p:cSld>
@@ -5383,27 +5392,20 @@
         </p:nvSpPr>
         <p:spPr>
           <a:xfrm>
-            <a:off x="5289754" y="639097"/>
-            <a:ext cx="6253317" cy="3686015"/>
+            <a:off x="5286999" y="-442420"/>
+            <a:ext cx="6253317" cy="2582271"/>
           </a:xfrm>
         </p:spPr>
         <p:txBody>
           <a:bodyPr>
-            <a:normAutofit fontScale="90000"/>
+            <a:normAutofit/>
           </a:bodyPr>
           <a:lstStyle/>
           <a:p>
             <a:pPr algn="ctr"/>
             <a:r>
-              <a:rPr lang="en-US" sz="8000" dirty="0"/>
-              <a:t>Mentored by:</a:t>
-            </a:r>
-            <a:br>
-              <a:rPr lang="en-US" sz="8000" dirty="0"/>
-            </a:br>
-            <a:r>
-              <a:rPr lang="en-US" sz="8000" dirty="0"/>
-              <a:t>Sonam Devgan</a:t>
+              <a:rPr lang="en-US" sz="6000" dirty="0"/>
+              <a:t>What does it do?</a:t>
             </a:r>
           </a:p>
         </p:txBody>
@@ -5498,716 +5500,6 @@
           </a:fontRef>
         </p:style>
       </p:cxnSp>
-    </p:spTree>
-    <p:extLst>
-      <p:ext uri="{BB962C8B-B14F-4D97-AF65-F5344CB8AC3E}">
-        <p14:creationId xmlns:p14="http://schemas.microsoft.com/office/powerpoint/2010/main" val="2960933268"/>
-      </p:ext>
-    </p:extLst>
-  </p:cSld>
-  <p:clrMapOvr>
-    <a:masterClrMapping/>
-  </p:clrMapOvr>
-</p:sld>
-</file>
-
-<file path=ppt/slides/slide6.xml><?xml version="1.0" encoding="utf-8"?>
-<p:sld xmlns:a="http://schemas.openxmlformats.org/drawingml/2006/main" xmlns:r="http://schemas.openxmlformats.org/officeDocument/2006/relationships" xmlns:p="http://schemas.openxmlformats.org/presentationml/2006/main">
-  <p:cSld>
-    <p:bg>
-      <p:bgPr>
-        <a:solidFill>
-          <a:schemeClr val="bg1"/>
-        </a:solidFill>
-        <a:effectLst/>
-      </p:bgPr>
-    </p:bg>
-    <p:spTree>
-      <p:nvGrpSpPr>
-        <p:cNvPr id="1" name=""/>
-        <p:cNvGrpSpPr/>
-        <p:nvPr/>
-      </p:nvGrpSpPr>
-      <p:grpSpPr>
-        <a:xfrm>
-          <a:off x="0" y="0"/>
-          <a:ext cx="0" cy="0"/>
-          <a:chOff x="0" y="0"/>
-          <a:chExt cx="0" cy="0"/>
-        </a:xfrm>
-      </p:grpSpPr>
-      <p:sp useBgFill="1">
-        <p:nvSpPr>
-          <p:cNvPr id="22" name="Rectangle 21">
-            <a:extLst>
-              <a:ext uri="{FF2B5EF4-FFF2-40B4-BE49-F238E27FC236}">
-                <a16:creationId xmlns:a16="http://schemas.microsoft.com/office/drawing/2014/main" id="{A9286AD2-18A9-4868-A4E3-7A2097A20810}"/>
-              </a:ext>
-              <a:ext uri="{C183D7F6-B498-43B3-948B-1728B52AA6E4}">
-                <adec:decorative xmlns:adec="http://schemas.microsoft.com/office/drawing/2017/decorative" val="1"/>
-              </a:ext>
-            </a:extLst>
-          </p:cNvPr>
-          <p:cNvSpPr>
-            <a:spLocks noGrp="1" noRot="1" noChangeAspect="1" noMove="1" noResize="1" noEditPoints="1" noAdjustHandles="1" noChangeArrowheads="1" noChangeShapeType="1" noTextEdit="1"/>
-          </p:cNvSpPr>
-          <p:nvPr>
-            <p:extLst>
-              <p:ext uri="{386F3935-93C4-4BCD-93E2-E3B085C9AB24}">
-                <p16:designElem xmlns:p16="http://schemas.microsoft.com/office/powerpoint/2015/main" val="1"/>
-              </p:ext>
-            </p:extLst>
-          </p:nvPr>
-        </p:nvSpPr>
-        <p:spPr>
-          <a:xfrm>
-            <a:off x="0" y="1"/>
-            <a:ext cx="12192001" cy="6857999"/>
-          </a:xfrm>
-          <a:prstGeom prst="rect">
-            <a:avLst/>
-          </a:prstGeom>
-          <a:ln>
-            <a:noFill/>
-          </a:ln>
-        </p:spPr>
-        <p:style>
-          <a:lnRef idx="2">
-            <a:schemeClr val="accent1">
-              <a:shade val="50000"/>
-            </a:schemeClr>
-          </a:lnRef>
-          <a:fillRef idx="1">
-            <a:schemeClr val="accent1"/>
-          </a:fillRef>
-          <a:effectRef idx="0">
-            <a:schemeClr val="accent1"/>
-          </a:effectRef>
-          <a:fontRef idx="minor">
-            <a:schemeClr val="lt1"/>
-          </a:fontRef>
-        </p:style>
-        <p:txBody>
-          <a:bodyPr rtlCol="0" anchor="ctr"/>
-          <a:lstStyle/>
-          <a:p>
-            <a:pPr algn="ctr"/>
-            <a:endParaRPr lang="en-US"/>
-          </a:p>
-        </p:txBody>
-      </p:sp>
-      <p:sp>
-        <p:nvSpPr>
-          <p:cNvPr id="2" name="Title 1">
-            <a:extLst>
-              <a:ext uri="{FF2B5EF4-FFF2-40B4-BE49-F238E27FC236}">
-                <a16:creationId xmlns:a16="http://schemas.microsoft.com/office/drawing/2014/main" id="{78FD68DA-43BA-4508-8DE2-BA9BB7B2FA5B}"/>
-              </a:ext>
-            </a:extLst>
-          </p:cNvPr>
-          <p:cNvSpPr>
-            <a:spLocks noGrp="1"/>
-          </p:cNvSpPr>
-          <p:nvPr>
-            <p:ph type="ctrTitle"/>
-          </p:nvPr>
-        </p:nvSpPr>
-        <p:spPr>
-          <a:xfrm>
-            <a:off x="5289754" y="639098"/>
-            <a:ext cx="6253317" cy="2582271"/>
-          </a:xfrm>
-        </p:spPr>
-        <p:txBody>
-          <a:bodyPr>
-            <a:normAutofit/>
-          </a:bodyPr>
-          <a:lstStyle/>
-          <a:p>
-            <a:pPr algn="ctr"/>
-            <a:r>
-              <a:rPr lang="en-CA" sz="6000" dirty="0"/>
-              <a:t>Entrepreneurial </a:t>
-            </a:r>
-            <a:r>
-              <a:rPr lang="en-US" sz="6000" dirty="0"/>
-              <a:t> Project</a:t>
-            </a:r>
-          </a:p>
-        </p:txBody>
-      </p:sp>
-      <p:pic>
-        <p:nvPicPr>
-          <p:cNvPr id="5" name="Picture 4" descr="A picture containing building, sitting, bench, side&#10;&#10;Description automatically generated">
-            <a:extLst>
-              <a:ext uri="{FF2B5EF4-FFF2-40B4-BE49-F238E27FC236}">
-                <a16:creationId xmlns:a16="http://schemas.microsoft.com/office/drawing/2014/main" id="{282CF6DD-7FE8-4063-9551-1B7BBCE92ABE}"/>
-              </a:ext>
-            </a:extLst>
-          </p:cNvPr>
-          <p:cNvPicPr>
-            <a:picLocks noChangeAspect="1"/>
-          </p:cNvPicPr>
-          <p:nvPr/>
-        </p:nvPicPr>
-        <p:blipFill rotWithShape="1">
-          <a:blip r:embed="rId2">
-            <a:extLst>
-              <a:ext uri="{28A0092B-C50C-407E-A947-70E740481C1C}">
-                <a14:useLocalDpi xmlns:a14="http://schemas.microsoft.com/office/drawing/2010/main" val="0"/>
-              </a:ext>
-            </a:extLst>
-          </a:blip>
-          <a:srcRect/>
-          <a:stretch/>
-        </p:blipFill>
-        <p:spPr>
-          <a:xfrm>
-            <a:off x="-1" y="1"/>
-            <a:ext cx="4635315" cy="6857999"/>
-          </a:xfrm>
-          <a:prstGeom prst="rect">
-            <a:avLst/>
-          </a:prstGeom>
-        </p:spPr>
-      </p:pic>
-      <p:cxnSp>
-        <p:nvCxnSpPr>
-          <p:cNvPr id="24" name="Straight Connector 23">
-            <a:extLst>
-              <a:ext uri="{FF2B5EF4-FFF2-40B4-BE49-F238E27FC236}">
-                <a16:creationId xmlns:a16="http://schemas.microsoft.com/office/drawing/2014/main" id="{E7A7CD63-7EC3-44F3-95D0-595C4019FF24}"/>
-              </a:ext>
-              <a:ext uri="{C183D7F6-B498-43B3-948B-1728B52AA6E4}">
-                <adec:decorative xmlns:adec="http://schemas.microsoft.com/office/drawing/2017/decorative" val="1"/>
-              </a:ext>
-            </a:extLst>
-          </p:cNvPr>
-          <p:cNvCxnSpPr>
-            <a:cxnSpLocks noGrp="1" noRot="1" noChangeAspect="1" noMove="1" noResize="1" noEditPoints="1" noAdjustHandles="1" noChangeArrowheads="1" noChangeShapeType="1"/>
-          </p:cNvCxnSpPr>
-          <p:nvPr>
-            <p:extLst>
-              <p:ext uri="{386F3935-93C4-4BCD-93E2-E3B085C9AB24}">
-                <p16:designElem xmlns:p16="http://schemas.microsoft.com/office/powerpoint/2015/main" val="1"/>
-              </p:ext>
-            </p:extLst>
-          </p:nvPr>
-        </p:nvCxnSpPr>
-        <p:spPr>
-          <a:xfrm>
-            <a:off x="5427754" y="4498925"/>
-            <a:ext cx="5636107" cy="0"/>
-          </a:xfrm>
-          <a:prstGeom prst="line">
-            <a:avLst/>
-          </a:prstGeom>
-          <a:ln w="12700">
-            <a:solidFill>
-              <a:schemeClr val="tx1">
-                <a:lumMod val="75000"/>
-                <a:lumOff val="25000"/>
-              </a:schemeClr>
-            </a:solidFill>
-          </a:ln>
-        </p:spPr>
-        <p:style>
-          <a:lnRef idx="1">
-            <a:schemeClr val="accent1"/>
-          </a:lnRef>
-          <a:fillRef idx="0">
-            <a:schemeClr val="accent1"/>
-          </a:fillRef>
-          <a:effectRef idx="0">
-            <a:schemeClr val="accent1"/>
-          </a:effectRef>
-          <a:fontRef idx="minor">
-            <a:schemeClr val="tx1"/>
-          </a:fontRef>
-        </p:style>
-      </p:cxnSp>
-    </p:spTree>
-    <p:extLst>
-      <p:ext uri="{BB962C8B-B14F-4D97-AF65-F5344CB8AC3E}">
-        <p14:creationId xmlns:p14="http://schemas.microsoft.com/office/powerpoint/2010/main" val="3319009500"/>
-      </p:ext>
-    </p:extLst>
-  </p:cSld>
-  <p:clrMapOvr>
-    <a:masterClrMapping/>
-  </p:clrMapOvr>
-</p:sld>
-</file>
-
-<file path=ppt/slides/slide7.xml><?xml version="1.0" encoding="utf-8"?>
-<p:sld xmlns:a="http://schemas.openxmlformats.org/drawingml/2006/main" xmlns:r="http://schemas.openxmlformats.org/officeDocument/2006/relationships" xmlns:p="http://schemas.openxmlformats.org/presentationml/2006/main">
-  <p:cSld>
-    <p:bg>
-      <p:bgPr>
-        <a:solidFill>
-          <a:schemeClr val="bg1"/>
-        </a:solidFill>
-        <a:effectLst/>
-      </p:bgPr>
-    </p:bg>
-    <p:spTree>
-      <p:nvGrpSpPr>
-        <p:cNvPr id="1" name=""/>
-        <p:cNvGrpSpPr/>
-        <p:nvPr/>
-      </p:nvGrpSpPr>
-      <p:grpSpPr>
-        <a:xfrm>
-          <a:off x="0" y="0"/>
-          <a:ext cx="0" cy="0"/>
-          <a:chOff x="0" y="0"/>
-          <a:chExt cx="0" cy="0"/>
-        </a:xfrm>
-      </p:grpSpPr>
-      <p:sp useBgFill="1">
-        <p:nvSpPr>
-          <p:cNvPr id="22" name="Rectangle 21">
-            <a:extLst>
-              <a:ext uri="{FF2B5EF4-FFF2-40B4-BE49-F238E27FC236}">
-                <a16:creationId xmlns:a16="http://schemas.microsoft.com/office/drawing/2014/main" id="{A9286AD2-18A9-4868-A4E3-7A2097A20810}"/>
-              </a:ext>
-              <a:ext uri="{C183D7F6-B498-43B3-948B-1728B52AA6E4}">
-                <adec:decorative xmlns:adec="http://schemas.microsoft.com/office/drawing/2017/decorative" val="1"/>
-              </a:ext>
-            </a:extLst>
-          </p:cNvPr>
-          <p:cNvSpPr>
-            <a:spLocks noGrp="1" noRot="1" noChangeAspect="1" noMove="1" noResize="1" noEditPoints="1" noAdjustHandles="1" noChangeArrowheads="1" noChangeShapeType="1" noTextEdit="1"/>
-          </p:cNvSpPr>
-          <p:nvPr>
-            <p:extLst>
-              <p:ext uri="{386F3935-93C4-4BCD-93E2-E3B085C9AB24}">
-                <p16:designElem xmlns:p16="http://schemas.microsoft.com/office/powerpoint/2015/main" val="1"/>
-              </p:ext>
-            </p:extLst>
-          </p:nvPr>
-        </p:nvSpPr>
-        <p:spPr>
-          <a:xfrm>
-            <a:off x="0" y="1"/>
-            <a:ext cx="12192001" cy="6857999"/>
-          </a:xfrm>
-          <a:prstGeom prst="rect">
-            <a:avLst/>
-          </a:prstGeom>
-          <a:ln>
-            <a:noFill/>
-          </a:ln>
-        </p:spPr>
-        <p:style>
-          <a:lnRef idx="2">
-            <a:schemeClr val="accent1">
-              <a:shade val="50000"/>
-            </a:schemeClr>
-          </a:lnRef>
-          <a:fillRef idx="1">
-            <a:schemeClr val="accent1"/>
-          </a:fillRef>
-          <a:effectRef idx="0">
-            <a:schemeClr val="accent1"/>
-          </a:effectRef>
-          <a:fontRef idx="minor">
-            <a:schemeClr val="lt1"/>
-          </a:fontRef>
-        </p:style>
-        <p:txBody>
-          <a:bodyPr rtlCol="0" anchor="ctr"/>
-          <a:lstStyle/>
-          <a:p>
-            <a:pPr algn="ctr"/>
-            <a:endParaRPr lang="en-US"/>
-          </a:p>
-        </p:txBody>
-      </p:sp>
-      <p:sp>
-        <p:nvSpPr>
-          <p:cNvPr id="2" name="Title 1">
-            <a:extLst>
-              <a:ext uri="{FF2B5EF4-FFF2-40B4-BE49-F238E27FC236}">
-                <a16:creationId xmlns:a16="http://schemas.microsoft.com/office/drawing/2014/main" id="{78FD68DA-43BA-4508-8DE2-BA9BB7B2FA5B}"/>
-              </a:ext>
-            </a:extLst>
-          </p:cNvPr>
-          <p:cNvSpPr>
-            <a:spLocks noGrp="1"/>
-          </p:cNvSpPr>
-          <p:nvPr>
-            <p:ph type="ctrTitle"/>
-          </p:nvPr>
-        </p:nvSpPr>
-        <p:spPr>
-          <a:xfrm>
-            <a:off x="5286999" y="3429000"/>
-            <a:ext cx="6253317" cy="2582271"/>
-          </a:xfrm>
-        </p:spPr>
-        <p:txBody>
-          <a:bodyPr>
-            <a:normAutofit fontScale="90000"/>
-          </a:bodyPr>
-          <a:lstStyle/>
-          <a:p>
-            <a:pPr algn="ctr"/>
-            <a:r>
-              <a:rPr lang="en-CA" sz="6000" dirty="0"/>
-              <a:t>Featuring:</a:t>
-            </a:r>
-            <a:br>
-              <a:rPr lang="en-CA" sz="6000" dirty="0"/>
-            </a:br>
-            <a:r>
-              <a:rPr lang="en-CA" sz="6000" dirty="0"/>
-              <a:t>SQL Server</a:t>
-            </a:r>
-            <a:br>
-              <a:rPr lang="en-CA" sz="6000" dirty="0"/>
-            </a:br>
-            <a:r>
-              <a:rPr lang="en-CA" sz="6000" dirty="0" err="1"/>
-              <a:t>ASP.Net</a:t>
-            </a:r>
-            <a:br>
-              <a:rPr lang="en-CA" sz="6000" dirty="0"/>
-            </a:br>
-            <a:r>
-              <a:rPr lang="en-CA" sz="6000" dirty="0"/>
-              <a:t>HTML5, CSS3, </a:t>
-            </a:r>
-            <a:r>
-              <a:rPr lang="en-CA" sz="6000" dirty="0" err="1"/>
-              <a:t>Javascript</a:t>
-            </a:r>
-            <a:r>
-              <a:rPr lang="en-CA" sz="6000" dirty="0"/>
-              <a:t> and </a:t>
-            </a:r>
-            <a:r>
-              <a:rPr lang="en-CA" sz="6000" dirty="0" err="1"/>
-              <a:t>Jquery</a:t>
-            </a:r>
-            <a:endParaRPr lang="en-US" sz="6000" dirty="0"/>
-          </a:p>
-        </p:txBody>
-      </p:sp>
-      <p:pic>
-        <p:nvPicPr>
-          <p:cNvPr id="5" name="Picture 4" descr="A picture containing building, sitting, bench, side&#10;&#10;Description automatically generated">
-            <a:extLst>
-              <a:ext uri="{FF2B5EF4-FFF2-40B4-BE49-F238E27FC236}">
-                <a16:creationId xmlns:a16="http://schemas.microsoft.com/office/drawing/2014/main" id="{282CF6DD-7FE8-4063-9551-1B7BBCE92ABE}"/>
-              </a:ext>
-            </a:extLst>
-          </p:cNvPr>
-          <p:cNvPicPr>
-            <a:picLocks noChangeAspect="1"/>
-          </p:cNvPicPr>
-          <p:nvPr/>
-        </p:nvPicPr>
-        <p:blipFill rotWithShape="1">
-          <a:blip r:embed="rId2">
-            <a:extLst>
-              <a:ext uri="{28A0092B-C50C-407E-A947-70E740481C1C}">
-                <a14:useLocalDpi xmlns:a14="http://schemas.microsoft.com/office/drawing/2010/main" val="0"/>
-              </a:ext>
-            </a:extLst>
-          </a:blip>
-          <a:srcRect/>
-          <a:stretch/>
-        </p:blipFill>
-        <p:spPr>
-          <a:xfrm>
-            <a:off x="-1" y="1"/>
-            <a:ext cx="4635315" cy="6857999"/>
-          </a:xfrm>
-          <a:prstGeom prst="rect">
-            <a:avLst/>
-          </a:prstGeom>
-        </p:spPr>
-      </p:pic>
-      <p:cxnSp>
-        <p:nvCxnSpPr>
-          <p:cNvPr id="24" name="Straight Connector 23">
-            <a:extLst>
-              <a:ext uri="{FF2B5EF4-FFF2-40B4-BE49-F238E27FC236}">
-                <a16:creationId xmlns:a16="http://schemas.microsoft.com/office/drawing/2014/main" id="{E7A7CD63-7EC3-44F3-95D0-595C4019FF24}"/>
-              </a:ext>
-              <a:ext uri="{C183D7F6-B498-43B3-948B-1728B52AA6E4}">
-                <adec:decorative xmlns:adec="http://schemas.microsoft.com/office/drawing/2017/decorative" val="1"/>
-              </a:ext>
-            </a:extLst>
-          </p:cNvPr>
-          <p:cNvCxnSpPr>
-            <a:cxnSpLocks noGrp="1" noRot="1" noChangeAspect="1" noMove="1" noResize="1" noEditPoints="1" noAdjustHandles="1" noChangeArrowheads="1" noChangeShapeType="1"/>
-          </p:cNvCxnSpPr>
-          <p:nvPr>
-            <p:extLst>
-              <p:ext uri="{386F3935-93C4-4BCD-93E2-E3B085C9AB24}">
-                <p16:designElem xmlns:p16="http://schemas.microsoft.com/office/powerpoint/2015/main" val="1"/>
-              </p:ext>
-            </p:extLst>
-          </p:nvPr>
-        </p:nvCxnSpPr>
-        <p:spPr>
-          <a:xfrm>
-            <a:off x="5427754" y="4498925"/>
-            <a:ext cx="5636107" cy="0"/>
-          </a:xfrm>
-          <a:prstGeom prst="line">
-            <a:avLst/>
-          </a:prstGeom>
-          <a:ln w="12700">
-            <a:solidFill>
-              <a:schemeClr val="tx1">
-                <a:lumMod val="75000"/>
-                <a:lumOff val="25000"/>
-              </a:schemeClr>
-            </a:solidFill>
-          </a:ln>
-        </p:spPr>
-        <p:style>
-          <a:lnRef idx="1">
-            <a:schemeClr val="accent1"/>
-          </a:lnRef>
-          <a:fillRef idx="0">
-            <a:schemeClr val="accent1"/>
-          </a:fillRef>
-          <a:effectRef idx="0">
-            <a:schemeClr val="accent1"/>
-          </a:effectRef>
-          <a:fontRef idx="minor">
-            <a:schemeClr val="tx1"/>
-          </a:fontRef>
-        </p:style>
-      </p:cxnSp>
-    </p:spTree>
-    <p:extLst>
-      <p:ext uri="{BB962C8B-B14F-4D97-AF65-F5344CB8AC3E}">
-        <p14:creationId xmlns:p14="http://schemas.microsoft.com/office/powerpoint/2010/main" val="998611654"/>
-      </p:ext>
-    </p:extLst>
-  </p:cSld>
-  <p:clrMapOvr>
-    <a:masterClrMapping/>
-  </p:clrMapOvr>
-</p:sld>
-</file>
-
-<file path=ppt/slides/slide8.xml><?xml version="1.0" encoding="utf-8"?>
-<p:sld xmlns:a="http://schemas.openxmlformats.org/drawingml/2006/main" xmlns:r="http://schemas.openxmlformats.org/officeDocument/2006/relationships" xmlns:p="http://schemas.openxmlformats.org/presentationml/2006/main">
-  <p:cSld>
-    <p:bg>
-      <p:bgPr>
-        <a:solidFill>
-          <a:schemeClr val="bg1"/>
-        </a:solidFill>
-        <a:effectLst/>
-      </p:bgPr>
-    </p:bg>
-    <p:spTree>
-      <p:nvGrpSpPr>
-        <p:cNvPr id="1" name=""/>
-        <p:cNvGrpSpPr/>
-        <p:nvPr/>
-      </p:nvGrpSpPr>
-      <p:grpSpPr>
-        <a:xfrm>
-          <a:off x="0" y="0"/>
-          <a:ext cx="0" cy="0"/>
-          <a:chOff x="0" y="0"/>
-          <a:chExt cx="0" cy="0"/>
-        </a:xfrm>
-      </p:grpSpPr>
-      <p:sp useBgFill="1">
-        <p:nvSpPr>
-          <p:cNvPr id="22" name="Rectangle 21">
-            <a:extLst>
-              <a:ext uri="{FF2B5EF4-FFF2-40B4-BE49-F238E27FC236}">
-                <a16:creationId xmlns:a16="http://schemas.microsoft.com/office/drawing/2014/main" id="{A9286AD2-18A9-4868-A4E3-7A2097A20810}"/>
-              </a:ext>
-              <a:ext uri="{C183D7F6-B498-43B3-948B-1728B52AA6E4}">
-                <adec:decorative xmlns:adec="http://schemas.microsoft.com/office/drawing/2017/decorative" val="1"/>
-              </a:ext>
-            </a:extLst>
-          </p:cNvPr>
-          <p:cNvSpPr>
-            <a:spLocks noGrp="1" noRot="1" noChangeAspect="1" noMove="1" noResize="1" noEditPoints="1" noAdjustHandles="1" noChangeArrowheads="1" noChangeShapeType="1" noTextEdit="1"/>
-          </p:cNvSpPr>
-          <p:nvPr>
-            <p:extLst>
-              <p:ext uri="{386F3935-93C4-4BCD-93E2-E3B085C9AB24}">
-                <p16:designElem xmlns:p16="http://schemas.microsoft.com/office/powerpoint/2015/main" val="1"/>
-              </p:ext>
-            </p:extLst>
-          </p:nvPr>
-        </p:nvSpPr>
-        <p:spPr>
-          <a:xfrm>
-            <a:off x="0" y="1"/>
-            <a:ext cx="12192001" cy="6857999"/>
-          </a:xfrm>
-          <a:prstGeom prst="rect">
-            <a:avLst/>
-          </a:prstGeom>
-          <a:ln>
-            <a:noFill/>
-          </a:ln>
-        </p:spPr>
-        <p:style>
-          <a:lnRef idx="2">
-            <a:schemeClr val="accent1">
-              <a:shade val="50000"/>
-            </a:schemeClr>
-          </a:lnRef>
-          <a:fillRef idx="1">
-            <a:schemeClr val="accent1"/>
-          </a:fillRef>
-          <a:effectRef idx="0">
-            <a:schemeClr val="accent1"/>
-          </a:effectRef>
-          <a:fontRef idx="minor">
-            <a:schemeClr val="lt1"/>
-          </a:fontRef>
-        </p:style>
-        <p:txBody>
-          <a:bodyPr rtlCol="0" anchor="ctr"/>
-          <a:lstStyle/>
-          <a:p>
-            <a:pPr algn="ctr"/>
-            <a:endParaRPr lang="en-US"/>
-          </a:p>
-        </p:txBody>
-      </p:sp>
-      <p:sp>
-        <p:nvSpPr>
-          <p:cNvPr id="2" name="Title 1">
-            <a:extLst>
-              <a:ext uri="{FF2B5EF4-FFF2-40B4-BE49-F238E27FC236}">
-                <a16:creationId xmlns:a16="http://schemas.microsoft.com/office/drawing/2014/main" id="{78FD68DA-43BA-4508-8DE2-BA9BB7B2FA5B}"/>
-              </a:ext>
-            </a:extLst>
-          </p:cNvPr>
-          <p:cNvSpPr>
-            <a:spLocks noGrp="1"/>
-          </p:cNvSpPr>
-          <p:nvPr>
-            <p:ph type="ctrTitle"/>
-          </p:nvPr>
-        </p:nvSpPr>
-        <p:spPr>
-          <a:xfrm>
-            <a:off x="5286999" y="-442420"/>
-            <a:ext cx="6253317" cy="2582271"/>
-          </a:xfrm>
-        </p:spPr>
-        <p:txBody>
-          <a:bodyPr>
-            <a:normAutofit/>
-          </a:bodyPr>
-          <a:lstStyle/>
-          <a:p>
-            <a:pPr algn="ctr"/>
-            <a:r>
-              <a:rPr lang="en-US" sz="6000" dirty="0"/>
-              <a:t>What does it do?</a:t>
-            </a:r>
-          </a:p>
-        </p:txBody>
-      </p:sp>
-      <p:pic>
-        <p:nvPicPr>
-          <p:cNvPr id="5" name="Picture 4" descr="A picture containing building, sitting, bench, side&#10;&#10;Description automatically generated">
-            <a:extLst>
-              <a:ext uri="{FF2B5EF4-FFF2-40B4-BE49-F238E27FC236}">
-                <a16:creationId xmlns:a16="http://schemas.microsoft.com/office/drawing/2014/main" id="{282CF6DD-7FE8-4063-9551-1B7BBCE92ABE}"/>
-              </a:ext>
-            </a:extLst>
-          </p:cNvPr>
-          <p:cNvPicPr>
-            <a:picLocks noChangeAspect="1"/>
-          </p:cNvPicPr>
-          <p:nvPr/>
-        </p:nvPicPr>
-        <p:blipFill rotWithShape="1">
-          <a:blip r:embed="rId2">
-            <a:extLst>
-              <a:ext uri="{28A0092B-C50C-407E-A947-70E740481C1C}">
-                <a14:useLocalDpi xmlns:a14="http://schemas.microsoft.com/office/drawing/2010/main" val="0"/>
-              </a:ext>
-            </a:extLst>
-          </a:blip>
-          <a:srcRect/>
-          <a:stretch/>
-        </p:blipFill>
-        <p:spPr>
-          <a:xfrm>
-            <a:off x="-1" y="1"/>
-            <a:ext cx="4635315" cy="6857999"/>
-          </a:xfrm>
-          <a:prstGeom prst="rect">
-            <a:avLst/>
-          </a:prstGeom>
-        </p:spPr>
-      </p:pic>
-      <p:cxnSp>
-        <p:nvCxnSpPr>
-          <p:cNvPr id="24" name="Straight Connector 23">
-            <a:extLst>
-              <a:ext uri="{FF2B5EF4-FFF2-40B4-BE49-F238E27FC236}">
-                <a16:creationId xmlns:a16="http://schemas.microsoft.com/office/drawing/2014/main" id="{E7A7CD63-7EC3-44F3-95D0-595C4019FF24}"/>
-              </a:ext>
-              <a:ext uri="{C183D7F6-B498-43B3-948B-1728B52AA6E4}">
-                <adec:decorative xmlns:adec="http://schemas.microsoft.com/office/drawing/2017/decorative" val="1"/>
-              </a:ext>
-            </a:extLst>
-          </p:cNvPr>
-          <p:cNvCxnSpPr>
-            <a:cxnSpLocks noGrp="1" noRot="1" noChangeAspect="1" noMove="1" noResize="1" noEditPoints="1" noAdjustHandles="1" noChangeArrowheads="1" noChangeShapeType="1"/>
-          </p:cNvCxnSpPr>
-          <p:nvPr>
-            <p:extLst>
-              <p:ext uri="{386F3935-93C4-4BCD-93E2-E3B085C9AB24}">
-                <p16:designElem xmlns:p16="http://schemas.microsoft.com/office/powerpoint/2015/main" val="1"/>
-              </p:ext>
-            </p:extLst>
-          </p:nvPr>
-        </p:nvCxnSpPr>
-        <p:spPr>
-          <a:xfrm>
-            <a:off x="5427754" y="4498925"/>
-            <a:ext cx="5636107" cy="0"/>
-          </a:xfrm>
-          <a:prstGeom prst="line">
-            <a:avLst/>
-          </a:prstGeom>
-          <a:ln w="12700">
-            <a:solidFill>
-              <a:schemeClr val="tx1">
-                <a:lumMod val="75000"/>
-                <a:lumOff val="25000"/>
-              </a:schemeClr>
-            </a:solidFill>
-          </a:ln>
-        </p:spPr>
-        <p:style>
-          <a:lnRef idx="1">
-            <a:schemeClr val="accent1"/>
-          </a:lnRef>
-          <a:fillRef idx="0">
-            <a:schemeClr val="accent1"/>
-          </a:fillRef>
-          <a:effectRef idx="0">
-            <a:schemeClr val="accent1"/>
-          </a:effectRef>
-          <a:fontRef idx="minor">
-            <a:schemeClr val="tx1"/>
-          </a:fontRef>
-        </p:style>
-      </p:cxnSp>
       <p:sp>
         <p:nvSpPr>
           <p:cNvPr id="3" name="TextBox 2">
@@ -6252,7 +5544,7 @@
             </a:pPr>
             <a:r>
               <a:rPr lang="en-CA" sz="2000" dirty="0"/>
-              <a:t>Migrate existing Excel inventory</a:t>
+              <a:t>Import existing Excel inventory</a:t>
             </a:r>
           </a:p>
           <a:p>
@@ -6320,7 +5612,7 @@
 </p:sld>
 </file>
 
-<file path=ppt/slides/slide9.xml><?xml version="1.0" encoding="utf-8"?>
+<file path=ppt/slides/slide6.xml><?xml version="1.0" encoding="utf-8"?>
 <p:sld xmlns:a="http://schemas.openxmlformats.org/drawingml/2006/main" xmlns:r="http://schemas.openxmlformats.org/officeDocument/2006/relationships" xmlns:p="http://schemas.openxmlformats.org/presentationml/2006/main">
   <p:cSld>
     <p:bg>

</xml_diff>